<commit_message>
Updated to include some context.
</commit_message>
<xml_diff>
--- a/src/MFM_data_creation.pptx
+++ b/src/MFM_data_creation.pptx
@@ -496,7 +496,7 @@
           <a:p>
             <a:fld id="{1CA1649C-0B36-7740-AEF1-798BAFD80F08}" type="datetimeFigureOut">
               <a:rPr lang="en-US" smtClean="0"/>
-              <a:t>3/26/21</a:t>
+              <a:t>8/30/22</a:t>
             </a:fld>
             <a:endParaRPr lang="en-US"/>
           </a:p>
@@ -694,7 +694,7 @@
           <a:p>
             <a:fld id="{1CA1649C-0B36-7740-AEF1-798BAFD80F08}" type="datetimeFigureOut">
               <a:rPr lang="en-US" smtClean="0"/>
-              <a:t>3/26/21</a:t>
+              <a:t>8/30/22</a:t>
             </a:fld>
             <a:endParaRPr lang="en-US"/>
           </a:p>
@@ -902,7 +902,7 @@
           <a:p>
             <a:fld id="{1CA1649C-0B36-7740-AEF1-798BAFD80F08}" type="datetimeFigureOut">
               <a:rPr lang="en-US" smtClean="0"/>
-              <a:t>3/26/21</a:t>
+              <a:t>8/30/22</a:t>
             </a:fld>
             <a:endParaRPr lang="en-US"/>
           </a:p>
@@ -1100,7 +1100,7 @@
           <a:p>
             <a:fld id="{1CA1649C-0B36-7740-AEF1-798BAFD80F08}" type="datetimeFigureOut">
               <a:rPr lang="en-US" smtClean="0"/>
-              <a:t>3/26/21</a:t>
+              <a:t>8/30/22</a:t>
             </a:fld>
             <a:endParaRPr lang="en-US"/>
           </a:p>
@@ -1375,7 +1375,7 @@
           <a:p>
             <a:fld id="{1CA1649C-0B36-7740-AEF1-798BAFD80F08}" type="datetimeFigureOut">
               <a:rPr lang="en-US" smtClean="0"/>
-              <a:t>3/26/21</a:t>
+              <a:t>8/30/22</a:t>
             </a:fld>
             <a:endParaRPr lang="en-US"/>
           </a:p>
@@ -1640,7 +1640,7 @@
           <a:p>
             <a:fld id="{1CA1649C-0B36-7740-AEF1-798BAFD80F08}" type="datetimeFigureOut">
               <a:rPr lang="en-US" smtClean="0"/>
-              <a:t>3/26/21</a:t>
+              <a:t>8/30/22</a:t>
             </a:fld>
             <a:endParaRPr lang="en-US"/>
           </a:p>
@@ -2052,7 +2052,7 @@
           <a:p>
             <a:fld id="{1CA1649C-0B36-7740-AEF1-798BAFD80F08}" type="datetimeFigureOut">
               <a:rPr lang="en-US" smtClean="0"/>
-              <a:t>3/26/21</a:t>
+              <a:t>8/30/22</a:t>
             </a:fld>
             <a:endParaRPr lang="en-US"/>
           </a:p>
@@ -2193,7 +2193,7 @@
           <a:p>
             <a:fld id="{1CA1649C-0B36-7740-AEF1-798BAFD80F08}" type="datetimeFigureOut">
               <a:rPr lang="en-US" smtClean="0"/>
-              <a:t>3/26/21</a:t>
+              <a:t>8/30/22</a:t>
             </a:fld>
             <a:endParaRPr lang="en-US"/>
           </a:p>
@@ -2306,7 +2306,7 @@
           <a:p>
             <a:fld id="{1CA1649C-0B36-7740-AEF1-798BAFD80F08}" type="datetimeFigureOut">
               <a:rPr lang="en-US" smtClean="0"/>
-              <a:t>3/26/21</a:t>
+              <a:t>8/30/22</a:t>
             </a:fld>
             <a:endParaRPr lang="en-US"/>
           </a:p>
@@ -2645,7 +2645,7 @@
           <a:p>
             <a:fld id="{1CA1649C-0B36-7740-AEF1-798BAFD80F08}" type="datetimeFigureOut">
               <a:rPr lang="en-US" smtClean="0"/>
-              <a:t>3/26/21</a:t>
+              <a:t>8/30/22</a:t>
             </a:fld>
             <a:endParaRPr lang="en-US"/>
           </a:p>
@@ -2933,7 +2933,7 @@
           <a:p>
             <a:fld id="{1CA1649C-0B36-7740-AEF1-798BAFD80F08}" type="datetimeFigureOut">
               <a:rPr lang="en-US" smtClean="0"/>
-              <a:t>3/26/21</a:t>
+              <a:t>8/30/22</a:t>
             </a:fld>
             <a:endParaRPr lang="en-US"/>
           </a:p>
@@ -3174,7 +3174,7 @@
           <a:p>
             <a:fld id="{1CA1649C-0B36-7740-AEF1-798BAFD80F08}" type="datetimeFigureOut">
               <a:rPr lang="en-US" smtClean="0"/>
-              <a:t>3/26/21</a:t>
+              <a:t>8/30/22</a:t>
             </a:fld>
             <a:endParaRPr lang="en-US"/>
           </a:p>
@@ -4753,15 +4753,13 @@
           </p:cNvPr>
           <p:cNvCxnSpPr>
             <a:cxnSpLocks/>
-            <a:stCxn id="47" idx="3"/>
-            <a:endCxn id="32" idx="1"/>
           </p:cNvCxnSpPr>
           <p:nvPr/>
         </p:nvCxnSpPr>
         <p:spPr>
-          <a:xfrm>
-            <a:off x="5759491" y="1846600"/>
-            <a:ext cx="227701" cy="1697772"/>
+          <a:xfrm flipH="1">
+            <a:off x="6580014" y="1792404"/>
+            <a:ext cx="3667" cy="1633375"/>
           </a:xfrm>
           <a:prstGeom prst="straightConnector1">
             <a:avLst/>
@@ -4799,7 +4797,7 @@
         </p:nvSpPr>
         <p:spPr>
           <a:xfrm>
-            <a:off x="5797112" y="3415579"/>
+            <a:off x="6132601" y="3415579"/>
             <a:ext cx="1297949" cy="879456"/>
           </a:xfrm>
           <a:prstGeom prst="ellipse">
@@ -4864,15 +4862,15 @@
           </p:cNvPr>
           <p:cNvCxnSpPr>
             <a:cxnSpLocks/>
-            <a:stCxn id="32" idx="0"/>
+            <a:stCxn id="32" idx="7"/>
             <a:endCxn id="39" idx="3"/>
           </p:cNvCxnSpPr>
           <p:nvPr/>
         </p:nvCxnSpPr>
         <p:spPr>
           <a:xfrm flipV="1">
-            <a:off x="6446087" y="2531548"/>
-            <a:ext cx="2313584" cy="884031"/>
+            <a:off x="7240470" y="2531548"/>
+            <a:ext cx="1519201" cy="1012824"/>
           </a:xfrm>
           <a:prstGeom prst="straightConnector1">
             <a:avLst/>
@@ -4908,14 +4906,13 @@
           <p:cNvCxnSpPr>
             <a:cxnSpLocks/>
             <a:stCxn id="32" idx="0"/>
-            <a:endCxn id="53" idx="2"/>
           </p:cNvCxnSpPr>
           <p:nvPr/>
         </p:nvCxnSpPr>
         <p:spPr>
           <a:xfrm flipV="1">
-            <a:off x="6446087" y="1480827"/>
-            <a:ext cx="734945" cy="1934752"/>
+            <a:off x="6781576" y="1651316"/>
+            <a:ext cx="408013" cy="1764263"/>
           </a:xfrm>
           <a:prstGeom prst="straightConnector1">
             <a:avLst/>
@@ -4939,6 +4936,131 @@
           </a:fontRef>
         </p:style>
       </p:cxnSp>
+      <p:sp>
+        <p:nvSpPr>
+          <p:cNvPr id="12" name="TextBox 11">
+            <a:extLst>
+              <a:ext uri="{FF2B5EF4-FFF2-40B4-BE49-F238E27FC236}">
+                <a16:creationId xmlns:a16="http://schemas.microsoft.com/office/drawing/2014/main" id="{0CDA5C32-45AD-0A9B-CC7F-F08323890B27}"/>
+              </a:ext>
+            </a:extLst>
+          </p:cNvPr>
+          <p:cNvSpPr txBox="1"/>
+          <p:nvPr/>
+        </p:nvSpPr>
+        <p:spPr>
+          <a:xfrm>
+            <a:off x="3894156" y="623811"/>
+            <a:ext cx="3766224" cy="369332"/>
+          </a:xfrm>
+          <a:prstGeom prst="rect">
+            <a:avLst/>
+          </a:prstGeom>
+          <a:noFill/>
+        </p:spPr>
+        <p:txBody>
+          <a:bodyPr wrap="none" rtlCol="0">
+            <a:spAutoFit/>
+          </a:bodyPr>
+          <a:lstStyle/>
+          <a:p>
+            <a:r>
+              <a:rPr lang="en-US" dirty="0"/>
+              <a:t>MFM Dataset field and target creation</a:t>
+            </a:r>
+          </a:p>
+        </p:txBody>
+      </p:sp>
+      <p:sp>
+        <p:nvSpPr>
+          <p:cNvPr id="15" name="TextBox 14">
+            <a:extLst>
+              <a:ext uri="{FF2B5EF4-FFF2-40B4-BE49-F238E27FC236}">
+                <a16:creationId xmlns:a16="http://schemas.microsoft.com/office/drawing/2014/main" id="{AC7890E3-DD57-6177-EFE9-E3E173777A4D}"/>
+              </a:ext>
+            </a:extLst>
+          </p:cNvPr>
+          <p:cNvSpPr txBox="1"/>
+          <p:nvPr/>
+        </p:nvSpPr>
+        <p:spPr>
+          <a:xfrm>
+            <a:off x="7514898" y="3593697"/>
+            <a:ext cx="2291846" cy="523220"/>
+          </a:xfrm>
+          <a:prstGeom prst="rect">
+            <a:avLst/>
+          </a:prstGeom>
+          <a:noFill/>
+        </p:spPr>
+        <p:txBody>
+          <a:bodyPr wrap="none" rtlCol="0">
+            <a:spAutoFit/>
+          </a:bodyPr>
+          <a:lstStyle/>
+          <a:p>
+            <a:r>
+              <a:rPr lang="en-US" sz="1400" dirty="0"/>
+              <a:t>Note: Process bubbles are all</a:t>
+            </a:r>
+          </a:p>
+          <a:p>
+            <a:r>
+              <a:rPr lang="en-US" sz="1400" dirty="0"/>
+              <a:t>Jupyter Notebooks (.</a:t>
+            </a:r>
+            <a:r>
+              <a:rPr lang="en-US" sz="1400" dirty="0" err="1"/>
+              <a:t>ipynb</a:t>
+            </a:r>
+            <a:r>
+              <a:rPr lang="en-US" sz="1400" dirty="0"/>
+              <a:t>)</a:t>
+            </a:r>
+          </a:p>
+        </p:txBody>
+      </p:sp>
+      <p:sp>
+        <p:nvSpPr>
+          <p:cNvPr id="18" name="TextBox 17">
+            <a:extLst>
+              <a:ext uri="{FF2B5EF4-FFF2-40B4-BE49-F238E27FC236}">
+                <a16:creationId xmlns:a16="http://schemas.microsoft.com/office/drawing/2014/main" id="{B124D218-533D-EE57-8F78-EC95FBEFB41C}"/>
+              </a:ext>
+            </a:extLst>
+          </p:cNvPr>
+          <p:cNvSpPr txBox="1"/>
+          <p:nvPr/>
+        </p:nvSpPr>
+        <p:spPr>
+          <a:xfrm>
+            <a:off x="1372365" y="1128096"/>
+            <a:ext cx="2073645" cy="523220"/>
+          </a:xfrm>
+          <a:prstGeom prst="rect">
+            <a:avLst/>
+          </a:prstGeom>
+          <a:noFill/>
+        </p:spPr>
+        <p:txBody>
+          <a:bodyPr wrap="none" rtlCol="0">
+            <a:spAutoFit/>
+          </a:bodyPr>
+          <a:lstStyle/>
+          <a:p>
+            <a:r>
+              <a:rPr lang="en-US" sz="1400" dirty="0"/>
+              <a:t>Note: Disk files are all </a:t>
+            </a:r>
+          </a:p>
+          <a:p>
+            <a:r>
+              <a:rPr lang="en-US" sz="1400" dirty="0"/>
+              <a:t>tab-separated value (.csv)</a:t>
+            </a:r>
+          </a:p>
+        </p:txBody>
+      </p:sp>
     </p:spTree>
     <p:extLst>
       <p:ext uri="{BB962C8B-B14F-4D97-AF65-F5344CB8AC3E}">

</xml_diff>